<commit_message>
con un nuevo modelo
</commit_message>
<xml_diff>
--- a/Presentación/Mineria-Presentacion3-Final.pptx
+++ b/Presentación/Mineria-Presentacion3-Final.pptx
@@ -10,9 +10,9 @@
     <p:sldId id="257" r:id="rId4"/>
     <p:sldId id="258" r:id="rId5"/>
     <p:sldId id="259" r:id="rId6"/>
-    <p:sldId id="260" r:id="rId7"/>
-    <p:sldId id="265" r:id="rId8"/>
-    <p:sldId id="264" r:id="rId9"/>
+    <p:sldId id="265" r:id="rId7"/>
+    <p:sldId id="264" r:id="rId8"/>
+    <p:sldId id="260" r:id="rId9"/>
     <p:sldId id="261" r:id="rId10"/>
     <p:sldId id="262" r:id="rId11"/>
     <p:sldId id="263" r:id="rId12"/>
@@ -7802,344 +7802,6 @@
           <a:chExt cx="0" cy="0"/>
         </a:xfrm>
       </p:grpSpPr>
-      <p:sp>
-        <p:nvSpPr>
-          <p:cNvPr id="89" name="PlaceHolder 1"/>
-          <p:cNvSpPr>
-            <a:spLocks noGrp="1"/>
-          </p:cNvSpPr>
-          <p:nvPr>
-            <p:ph type="title"/>
-          </p:nvPr>
-        </p:nvSpPr>
-        <p:spPr>
-          <a:xfrm>
-            <a:off x="838080" y="365040"/>
-            <a:ext cx="10515240" cy="1325160"/>
-          </a:xfrm>
-          <a:prstGeom prst="rect">
-            <a:avLst/>
-          </a:prstGeom>
-          <a:noFill/>
-          <a:ln w="0">
-            <a:noFill/>
-          </a:ln>
-        </p:spPr>
-        <p:txBody>
-          <a:bodyPr lIns="91440" tIns="45720" rIns="91440" bIns="45720" anchor="ctr">
-            <a:noAutofit/>
-          </a:bodyPr>
-          <a:lstStyle/>
-          <a:p>
-            <a:pPr indent="0" defTabSz="914400">
-              <a:lnSpc>
-                <a:spcPct val="90000"/>
-              </a:lnSpc>
-              <a:buNone/>
-            </a:pPr>
-            <a:r>
-              <a:rPr lang="es-MX" sz="4400" b="0" strike="noStrike" spc="-1">
-                <a:solidFill>
-                  <a:schemeClr val="dk1"/>
-                </a:solidFill>
-                <a:latin typeface="Calibri Light"/>
-              </a:rPr>
-              <a:t>Resumen de los datos</a:t>
-            </a:r>
-            <a:endParaRPr lang="es-MX" sz="4400" b="0" strike="noStrike" spc="-1">
-              <a:solidFill>
-                <a:schemeClr val="dk1"/>
-              </a:solidFill>
-              <a:latin typeface="Calibri"/>
-            </a:endParaRPr>
-          </a:p>
-        </p:txBody>
-      </p:sp>
-      <p:sp>
-        <p:nvSpPr>
-          <p:cNvPr id="90" name="PlaceHolder 2"/>
-          <p:cNvSpPr>
-            <a:spLocks noGrp="1"/>
-          </p:cNvSpPr>
-          <p:nvPr>
-            <p:ph/>
-          </p:nvPr>
-        </p:nvSpPr>
-        <p:spPr>
-          <a:xfrm>
-            <a:off x="838080" y="1825560"/>
-            <a:ext cx="10515240" cy="4350960"/>
-          </a:xfrm>
-          <a:prstGeom prst="rect">
-            <a:avLst/>
-          </a:prstGeom>
-          <a:noFill/>
-          <a:ln w="0">
-            <a:noFill/>
-          </a:ln>
-        </p:spPr>
-        <p:txBody>
-          <a:bodyPr lIns="91440" tIns="45720" rIns="91440" bIns="45720" anchor="t">
-            <a:normAutofit fontScale="96408"/>
-          </a:bodyPr>
-          <a:lstStyle/>
-          <a:p>
-            <a:pPr marL="228600" indent="-228600" defTabSz="914400">
-              <a:lnSpc>
-                <a:spcPct val="90000"/>
-              </a:lnSpc>
-              <a:spcBef>
-                <a:spcPts val="1001"/>
-              </a:spcBef>
-              <a:buClr>
-                <a:srgbClr val="000000"/>
-              </a:buClr>
-              <a:buFont typeface="Arial"/>
-              <a:buChar char="•"/>
-            </a:pPr>
-            <a:r>
-              <a:rPr lang="es-MX" sz="2800" b="0" strike="noStrike" spc="-1" dirty="0">
-                <a:solidFill>
-                  <a:schemeClr val="dk1"/>
-                </a:solidFill>
-                <a:latin typeface="Calibri"/>
-              </a:rPr>
-              <a:t>Número de registro y número de variables (tanto independientes como objetivo).</a:t>
-            </a:r>
-          </a:p>
-          <a:p>
-            <a:pPr marL="228600" indent="-228600" defTabSz="914400">
-              <a:lnSpc>
-                <a:spcPct val="90000"/>
-              </a:lnSpc>
-              <a:spcBef>
-                <a:spcPts val="1001"/>
-              </a:spcBef>
-              <a:buClr>
-                <a:srgbClr val="000000"/>
-              </a:buClr>
-              <a:buFont typeface="Arial"/>
-              <a:buChar char="•"/>
-            </a:pPr>
-            <a:r>
-              <a:rPr lang="es-MX" sz="2800" b="0" strike="noStrike" spc="-1" dirty="0">
-                <a:solidFill>
-                  <a:schemeClr val="dk1"/>
-                </a:solidFill>
-                <a:latin typeface="Calibri"/>
-              </a:rPr>
-              <a:t>No es necesario volver a hablar de los tipos de variables.</a:t>
-            </a:r>
-          </a:p>
-          <a:p>
-            <a:pPr marL="228600" indent="-228600" defTabSz="914400">
-              <a:lnSpc>
-                <a:spcPct val="90000"/>
-              </a:lnSpc>
-              <a:spcBef>
-                <a:spcPts val="1001"/>
-              </a:spcBef>
-              <a:buClr>
-                <a:srgbClr val="000000"/>
-              </a:buClr>
-              <a:buFont typeface="Arial"/>
-              <a:buChar char="•"/>
-            </a:pPr>
-            <a:r>
-              <a:rPr lang="es-MX" sz="2800" b="0" strike="noStrike" spc="-1" dirty="0">
-                <a:solidFill>
-                  <a:schemeClr val="dk1"/>
-                </a:solidFill>
-                <a:latin typeface="Calibri"/>
-              </a:rPr>
-              <a:t>Pero sí recordar las conclusiones de su EDA</a:t>
-            </a:r>
-          </a:p>
-          <a:p>
-            <a:pPr marL="685800" lvl="1" indent="-228600" defTabSz="914400">
-              <a:lnSpc>
-                <a:spcPct val="90000"/>
-              </a:lnSpc>
-              <a:spcBef>
-                <a:spcPts val="499"/>
-              </a:spcBef>
-              <a:buClr>
-                <a:srgbClr val="000000"/>
-              </a:buClr>
-              <a:buFont typeface="Arial"/>
-              <a:buChar char="•"/>
-            </a:pPr>
-            <a:r>
-              <a:rPr lang="es-MX" sz="2400" b="0" strike="noStrike" spc="-1" dirty="0">
-                <a:solidFill>
-                  <a:schemeClr val="dk1"/>
-                </a:solidFill>
-                <a:latin typeface="Calibri"/>
-              </a:rPr>
-              <a:t>¿cuáles variables parecen ser más interesantes/prometedoras?</a:t>
-            </a:r>
-          </a:p>
-          <a:p>
-            <a:pPr marL="685800" lvl="1" indent="-228600" defTabSz="914400">
-              <a:lnSpc>
-                <a:spcPct val="90000"/>
-              </a:lnSpc>
-              <a:spcBef>
-                <a:spcPts val="499"/>
-              </a:spcBef>
-              <a:buClr>
-                <a:srgbClr val="000000"/>
-              </a:buClr>
-              <a:buFont typeface="Arial"/>
-              <a:buChar char="•"/>
-            </a:pPr>
-            <a:r>
-              <a:rPr lang="es-MX" sz="2400" b="0" strike="noStrike" spc="-1" dirty="0">
-                <a:solidFill>
-                  <a:schemeClr val="dk1"/>
-                </a:solidFill>
-                <a:latin typeface="Calibri"/>
-              </a:rPr>
-              <a:t>¿Hay balance o desbalance entre las clases?</a:t>
-            </a:r>
-          </a:p>
-          <a:p>
-            <a:pPr marL="228600" indent="-228600" defTabSz="914400">
-              <a:lnSpc>
-                <a:spcPct val="90000"/>
-              </a:lnSpc>
-              <a:spcBef>
-                <a:spcPts val="1001"/>
-              </a:spcBef>
-              <a:buClr>
-                <a:srgbClr val="000000"/>
-              </a:buClr>
-              <a:buFont typeface="Arial"/>
-              <a:buChar char="•"/>
-            </a:pPr>
-            <a:r>
-              <a:rPr lang="es-MX" sz="2800" b="0" strike="noStrike" spc="-1" dirty="0">
-                <a:solidFill>
-                  <a:schemeClr val="dk1"/>
-                </a:solidFill>
-                <a:latin typeface="Calibri"/>
-              </a:rPr>
-              <a:t>Transformaciones aplicadas a los datos.</a:t>
-            </a:r>
-          </a:p>
-          <a:p>
-            <a:pPr marL="228600" indent="-228600" defTabSz="914400">
-              <a:lnSpc>
-                <a:spcPct val="90000"/>
-              </a:lnSpc>
-              <a:spcBef>
-                <a:spcPts val="1001"/>
-              </a:spcBef>
-              <a:buClr>
-                <a:srgbClr val="000000"/>
-              </a:buClr>
-              <a:buFont typeface="Arial"/>
-              <a:buChar char="•"/>
-            </a:pPr>
-            <a:r>
-              <a:rPr lang="es-MX" sz="2800" b="0" strike="noStrike" spc="-1" dirty="0">
-                <a:solidFill>
-                  <a:schemeClr val="dk1"/>
-                </a:solidFill>
-                <a:latin typeface="Calibri"/>
-              </a:rPr>
-              <a:t>Organización de los datos</a:t>
-            </a:r>
-          </a:p>
-          <a:p>
-            <a:pPr marL="685800" lvl="1" indent="-228600" defTabSz="914400">
-              <a:lnSpc>
-                <a:spcPct val="90000"/>
-              </a:lnSpc>
-              <a:spcBef>
-                <a:spcPts val="499"/>
-              </a:spcBef>
-              <a:buClr>
-                <a:srgbClr val="000000"/>
-              </a:buClr>
-              <a:buFont typeface="Arial"/>
-              <a:buChar char="•"/>
-            </a:pPr>
-            <a:r>
-              <a:rPr lang="es-MX" sz="2400" b="0" strike="noStrike" spc="-1" dirty="0">
-                <a:solidFill>
-                  <a:schemeClr val="dk1"/>
-                </a:solidFill>
-                <a:latin typeface="Calibri"/>
-                <a:ea typeface="Calibri"/>
-              </a:rPr>
-              <a:t>¿Cómo subdividieron la base de datos: entrenamiento, validación, prueba?</a:t>
-            </a:r>
-            <a:endParaRPr lang="es-MX" sz="2400" b="0" strike="noStrike" spc="-1" dirty="0">
-              <a:solidFill>
-                <a:schemeClr val="dk1"/>
-              </a:solidFill>
-              <a:latin typeface="Calibri"/>
-            </a:endParaRPr>
-          </a:p>
-          <a:p>
-            <a:pPr marL="685800" lvl="1" indent="-228600" defTabSz="914400">
-              <a:lnSpc>
-                <a:spcPct val="90000"/>
-              </a:lnSpc>
-              <a:spcBef>
-                <a:spcPts val="499"/>
-              </a:spcBef>
-              <a:buClr>
-                <a:srgbClr val="000000"/>
-              </a:buClr>
-              <a:buFont typeface="Arial"/>
-              <a:buChar char="•"/>
-            </a:pPr>
-            <a:r>
-              <a:rPr lang="es-MX" sz="2400" b="0" strike="noStrike" spc="-1" dirty="0">
-                <a:solidFill>
-                  <a:schemeClr val="dk1"/>
-                </a:solidFill>
-                <a:latin typeface="Calibri"/>
-                <a:ea typeface="Calibri"/>
-              </a:rPr>
-              <a:t>¿Cuántos en cada subset?</a:t>
-            </a:r>
-            <a:endParaRPr lang="es-MX" sz="2400" b="0" strike="noStrike" spc="-1" dirty="0">
-              <a:solidFill>
-                <a:schemeClr val="dk1"/>
-              </a:solidFill>
-              <a:latin typeface="Calibri"/>
-            </a:endParaRPr>
-          </a:p>
-        </p:txBody>
-      </p:sp>
-    </p:spTree>
-  </p:cSld>
-  <p:clrMapOvr>
-    <a:masterClrMapping/>
-  </p:clrMapOvr>
-</p:sld>
-</file>
-
-<file path=ppt/slides/slide6.xml><?xml version="1.0" encoding="utf-8"?>
-<p:sld xmlns:a="http://schemas.openxmlformats.org/drawingml/2006/main" xmlns:r="http://schemas.openxmlformats.org/officeDocument/2006/relationships" xmlns:p="http://schemas.openxmlformats.org/presentationml/2006/main">
-  <p:cSld>
-    <p:spTree>
-      <p:nvGrpSpPr>
-        <p:cNvPr id="1" name=""/>
-        <p:cNvGrpSpPr/>
-        <p:nvPr/>
-      </p:nvGrpSpPr>
-      <p:grpSpPr>
-        <a:xfrm>
-          <a:off x="0" y="0"/>
-          <a:ext cx="0" cy="0"/>
-          <a:chOff x="0" y="0"/>
-          <a:chExt cx="0" cy="0"/>
-        </a:xfrm>
-      </p:grpSpPr>
       <p:grpSp>
         <p:nvGrpSpPr>
           <p:cNvPr id="10" name="Grupo 9">
@@ -8254,7 +7916,7 @@
 </p:sld>
 </file>
 
-<file path=ppt/slides/slide7.xml><?xml version="1.0" encoding="utf-8"?>
+<file path=ppt/slides/slide6.xml><?xml version="1.0" encoding="utf-8"?>
 <p:sld xmlns:a="http://schemas.openxmlformats.org/drawingml/2006/main" xmlns:r="http://schemas.openxmlformats.org/officeDocument/2006/relationships" xmlns:p="http://schemas.openxmlformats.org/presentationml/2006/main">
   <p:cSld>
     <p:spTree>
@@ -8921,6 +8583,344 @@
 </p:sld>
 </file>
 
+<file path=ppt/slides/slide7.xml><?xml version="1.0" encoding="utf-8"?>
+<p:sld xmlns:a="http://schemas.openxmlformats.org/drawingml/2006/main" xmlns:r="http://schemas.openxmlformats.org/officeDocument/2006/relationships" xmlns:p="http://schemas.openxmlformats.org/presentationml/2006/main">
+  <p:cSld>
+    <p:spTree>
+      <p:nvGrpSpPr>
+        <p:cNvPr id="1" name=""/>
+        <p:cNvGrpSpPr/>
+        <p:nvPr/>
+      </p:nvGrpSpPr>
+      <p:grpSpPr>
+        <a:xfrm>
+          <a:off x="0" y="0"/>
+          <a:ext cx="0" cy="0"/>
+          <a:chOff x="0" y="0"/>
+          <a:chExt cx="0" cy="0"/>
+        </a:xfrm>
+      </p:grpSpPr>
+      <p:sp>
+        <p:nvSpPr>
+          <p:cNvPr id="89" name="PlaceHolder 1"/>
+          <p:cNvSpPr>
+            <a:spLocks noGrp="1"/>
+          </p:cNvSpPr>
+          <p:nvPr>
+            <p:ph type="title"/>
+          </p:nvPr>
+        </p:nvSpPr>
+        <p:spPr>
+          <a:xfrm>
+            <a:off x="838080" y="365040"/>
+            <a:ext cx="10515240" cy="1325160"/>
+          </a:xfrm>
+          <a:prstGeom prst="rect">
+            <a:avLst/>
+          </a:prstGeom>
+          <a:noFill/>
+          <a:ln w="0">
+            <a:noFill/>
+          </a:ln>
+        </p:spPr>
+        <p:txBody>
+          <a:bodyPr lIns="91440" tIns="45720" rIns="91440" bIns="45720" anchor="ctr">
+            <a:noAutofit/>
+          </a:bodyPr>
+          <a:lstStyle/>
+          <a:p>
+            <a:pPr indent="0" defTabSz="914400">
+              <a:lnSpc>
+                <a:spcPct val="90000"/>
+              </a:lnSpc>
+              <a:buNone/>
+            </a:pPr>
+            <a:r>
+              <a:rPr lang="es-MX" sz="4400" b="0" strike="noStrike" spc="-1">
+                <a:solidFill>
+                  <a:schemeClr val="dk1"/>
+                </a:solidFill>
+                <a:latin typeface="Calibri Light"/>
+              </a:rPr>
+              <a:t>Resumen de los datos</a:t>
+            </a:r>
+            <a:endParaRPr lang="es-MX" sz="4400" b="0" strike="noStrike" spc="-1">
+              <a:solidFill>
+                <a:schemeClr val="dk1"/>
+              </a:solidFill>
+              <a:latin typeface="Calibri"/>
+            </a:endParaRPr>
+          </a:p>
+        </p:txBody>
+      </p:sp>
+      <p:sp>
+        <p:nvSpPr>
+          <p:cNvPr id="90" name="PlaceHolder 2"/>
+          <p:cNvSpPr>
+            <a:spLocks noGrp="1"/>
+          </p:cNvSpPr>
+          <p:nvPr>
+            <p:ph/>
+          </p:nvPr>
+        </p:nvSpPr>
+        <p:spPr>
+          <a:xfrm>
+            <a:off x="838080" y="1825560"/>
+            <a:ext cx="10515240" cy="4350960"/>
+          </a:xfrm>
+          <a:prstGeom prst="rect">
+            <a:avLst/>
+          </a:prstGeom>
+          <a:noFill/>
+          <a:ln w="0">
+            <a:noFill/>
+          </a:ln>
+        </p:spPr>
+        <p:txBody>
+          <a:bodyPr lIns="91440" tIns="45720" rIns="91440" bIns="45720" anchor="t">
+            <a:normAutofit fontScale="96408"/>
+          </a:bodyPr>
+          <a:lstStyle/>
+          <a:p>
+            <a:pPr marL="228600" indent="-228600" defTabSz="914400">
+              <a:lnSpc>
+                <a:spcPct val="90000"/>
+              </a:lnSpc>
+              <a:spcBef>
+                <a:spcPts val="1001"/>
+              </a:spcBef>
+              <a:buClr>
+                <a:srgbClr val="000000"/>
+              </a:buClr>
+              <a:buFont typeface="Arial"/>
+              <a:buChar char="•"/>
+            </a:pPr>
+            <a:r>
+              <a:rPr lang="es-MX" sz="2800" b="0" strike="noStrike" spc="-1" dirty="0">
+                <a:solidFill>
+                  <a:schemeClr val="dk1"/>
+                </a:solidFill>
+                <a:latin typeface="Calibri"/>
+              </a:rPr>
+              <a:t>Número de registro y número de variables (tanto independientes como objetivo).</a:t>
+            </a:r>
+          </a:p>
+          <a:p>
+            <a:pPr marL="228600" indent="-228600" defTabSz="914400">
+              <a:lnSpc>
+                <a:spcPct val="90000"/>
+              </a:lnSpc>
+              <a:spcBef>
+                <a:spcPts val="1001"/>
+              </a:spcBef>
+              <a:buClr>
+                <a:srgbClr val="000000"/>
+              </a:buClr>
+              <a:buFont typeface="Arial"/>
+              <a:buChar char="•"/>
+            </a:pPr>
+            <a:r>
+              <a:rPr lang="es-MX" sz="2800" b="0" strike="noStrike" spc="-1" dirty="0">
+                <a:solidFill>
+                  <a:schemeClr val="dk1"/>
+                </a:solidFill>
+                <a:latin typeface="Calibri"/>
+              </a:rPr>
+              <a:t>No es necesario volver a hablar de los tipos de variables.</a:t>
+            </a:r>
+          </a:p>
+          <a:p>
+            <a:pPr marL="228600" indent="-228600" defTabSz="914400">
+              <a:lnSpc>
+                <a:spcPct val="90000"/>
+              </a:lnSpc>
+              <a:spcBef>
+                <a:spcPts val="1001"/>
+              </a:spcBef>
+              <a:buClr>
+                <a:srgbClr val="000000"/>
+              </a:buClr>
+              <a:buFont typeface="Arial"/>
+              <a:buChar char="•"/>
+            </a:pPr>
+            <a:r>
+              <a:rPr lang="es-MX" sz="2800" b="0" strike="noStrike" spc="-1" dirty="0">
+                <a:solidFill>
+                  <a:schemeClr val="dk1"/>
+                </a:solidFill>
+                <a:latin typeface="Calibri"/>
+              </a:rPr>
+              <a:t>Pero sí recordar las conclusiones de su EDA</a:t>
+            </a:r>
+          </a:p>
+          <a:p>
+            <a:pPr marL="685800" lvl="1" indent="-228600" defTabSz="914400">
+              <a:lnSpc>
+                <a:spcPct val="90000"/>
+              </a:lnSpc>
+              <a:spcBef>
+                <a:spcPts val="499"/>
+              </a:spcBef>
+              <a:buClr>
+                <a:srgbClr val="000000"/>
+              </a:buClr>
+              <a:buFont typeface="Arial"/>
+              <a:buChar char="•"/>
+            </a:pPr>
+            <a:r>
+              <a:rPr lang="es-MX" sz="2400" b="0" strike="noStrike" spc="-1" dirty="0">
+                <a:solidFill>
+                  <a:schemeClr val="dk1"/>
+                </a:solidFill>
+                <a:latin typeface="Calibri"/>
+              </a:rPr>
+              <a:t>¿cuáles variables parecen ser más interesantes/prometedoras?</a:t>
+            </a:r>
+          </a:p>
+          <a:p>
+            <a:pPr marL="685800" lvl="1" indent="-228600" defTabSz="914400">
+              <a:lnSpc>
+                <a:spcPct val="90000"/>
+              </a:lnSpc>
+              <a:spcBef>
+                <a:spcPts val="499"/>
+              </a:spcBef>
+              <a:buClr>
+                <a:srgbClr val="000000"/>
+              </a:buClr>
+              <a:buFont typeface="Arial"/>
+              <a:buChar char="•"/>
+            </a:pPr>
+            <a:r>
+              <a:rPr lang="es-MX" sz="2400" b="0" strike="noStrike" spc="-1" dirty="0">
+                <a:solidFill>
+                  <a:schemeClr val="dk1"/>
+                </a:solidFill>
+                <a:latin typeface="Calibri"/>
+              </a:rPr>
+              <a:t>¿Hay balance o desbalance entre las clases?</a:t>
+            </a:r>
+          </a:p>
+          <a:p>
+            <a:pPr marL="228600" indent="-228600" defTabSz="914400">
+              <a:lnSpc>
+                <a:spcPct val="90000"/>
+              </a:lnSpc>
+              <a:spcBef>
+                <a:spcPts val="1001"/>
+              </a:spcBef>
+              <a:buClr>
+                <a:srgbClr val="000000"/>
+              </a:buClr>
+              <a:buFont typeface="Arial"/>
+              <a:buChar char="•"/>
+            </a:pPr>
+            <a:r>
+              <a:rPr lang="es-MX" sz="2800" b="0" strike="noStrike" spc="-1" dirty="0">
+                <a:solidFill>
+                  <a:schemeClr val="dk1"/>
+                </a:solidFill>
+                <a:latin typeface="Calibri"/>
+              </a:rPr>
+              <a:t>Transformaciones aplicadas a los datos.</a:t>
+            </a:r>
+          </a:p>
+          <a:p>
+            <a:pPr marL="228600" indent="-228600" defTabSz="914400">
+              <a:lnSpc>
+                <a:spcPct val="90000"/>
+              </a:lnSpc>
+              <a:spcBef>
+                <a:spcPts val="1001"/>
+              </a:spcBef>
+              <a:buClr>
+                <a:srgbClr val="000000"/>
+              </a:buClr>
+              <a:buFont typeface="Arial"/>
+              <a:buChar char="•"/>
+            </a:pPr>
+            <a:r>
+              <a:rPr lang="es-MX" sz="2800" b="0" strike="noStrike" spc="-1" dirty="0">
+                <a:solidFill>
+                  <a:schemeClr val="dk1"/>
+                </a:solidFill>
+                <a:latin typeface="Calibri"/>
+              </a:rPr>
+              <a:t>Organización de los datos</a:t>
+            </a:r>
+          </a:p>
+          <a:p>
+            <a:pPr marL="685800" lvl="1" indent="-228600" defTabSz="914400">
+              <a:lnSpc>
+                <a:spcPct val="90000"/>
+              </a:lnSpc>
+              <a:spcBef>
+                <a:spcPts val="499"/>
+              </a:spcBef>
+              <a:buClr>
+                <a:srgbClr val="000000"/>
+              </a:buClr>
+              <a:buFont typeface="Arial"/>
+              <a:buChar char="•"/>
+            </a:pPr>
+            <a:r>
+              <a:rPr lang="es-MX" sz="2400" b="0" strike="noStrike" spc="-1" dirty="0">
+                <a:solidFill>
+                  <a:schemeClr val="dk1"/>
+                </a:solidFill>
+                <a:latin typeface="Calibri"/>
+                <a:ea typeface="Calibri"/>
+              </a:rPr>
+              <a:t>¿Cómo subdividieron la base de datos: entrenamiento, validación, prueba?</a:t>
+            </a:r>
+            <a:endParaRPr lang="es-MX" sz="2400" b="0" strike="noStrike" spc="-1" dirty="0">
+              <a:solidFill>
+                <a:schemeClr val="dk1"/>
+              </a:solidFill>
+              <a:latin typeface="Calibri"/>
+            </a:endParaRPr>
+          </a:p>
+          <a:p>
+            <a:pPr marL="685800" lvl="1" indent="-228600" defTabSz="914400">
+              <a:lnSpc>
+                <a:spcPct val="90000"/>
+              </a:lnSpc>
+              <a:spcBef>
+                <a:spcPts val="499"/>
+              </a:spcBef>
+              <a:buClr>
+                <a:srgbClr val="000000"/>
+              </a:buClr>
+              <a:buFont typeface="Arial"/>
+              <a:buChar char="•"/>
+            </a:pPr>
+            <a:r>
+              <a:rPr lang="es-MX" sz="2400" b="0" strike="noStrike" spc="-1" dirty="0">
+                <a:solidFill>
+                  <a:schemeClr val="dk1"/>
+                </a:solidFill>
+                <a:latin typeface="Calibri"/>
+                <a:ea typeface="Calibri"/>
+              </a:rPr>
+              <a:t>¿Cuántos en cada subset?</a:t>
+            </a:r>
+            <a:endParaRPr lang="es-MX" sz="2400" b="0" strike="noStrike" spc="-1" dirty="0">
+              <a:solidFill>
+                <a:schemeClr val="dk1"/>
+              </a:solidFill>
+              <a:latin typeface="Calibri"/>
+            </a:endParaRPr>
+          </a:p>
+        </p:txBody>
+      </p:sp>
+    </p:spTree>
+  </p:cSld>
+  <p:clrMapOvr>
+    <a:masterClrMapping/>
+  </p:clrMapOvr>
+</p:sld>
+</file>
+
 <file path=ppt/slides/slide8.xml><?xml version="1.0" encoding="utf-8"?>
 <p:sld xmlns:a="http://schemas.openxmlformats.org/drawingml/2006/main" xmlns:r="http://schemas.openxmlformats.org/officeDocument/2006/relationships" xmlns:p="http://schemas.openxmlformats.org/presentationml/2006/main">
   <p:cSld>
@@ -8974,7 +8974,7 @@
               <a:buNone/>
             </a:pPr>
             <a:r>
-              <a:rPr lang="es-MX" sz="4400" b="0" strike="noStrike" spc="-1">
+              <a:rPr lang="es-MX" sz="4400" b="0" strike="noStrike" spc="-1" dirty="0">
                 <a:solidFill>
                   <a:schemeClr val="dk1"/>
                 </a:solidFill>
@@ -8982,7 +8982,7 @@
               </a:rPr>
               <a:t>Resultados</a:t>
             </a:r>
-            <a:endParaRPr lang="es-MX" sz="4400" b="0" strike="noStrike" spc="-1">
+            <a:endParaRPr lang="es-MX" sz="4400" b="0" strike="noStrike" spc="-1" dirty="0">
               <a:solidFill>
                 <a:schemeClr val="dk1"/>
               </a:solidFill>
@@ -9034,7 +9034,7 @@
               <a:buChar char="•"/>
             </a:pPr>
             <a:r>
-              <a:rPr lang="es-MX" sz="2800" b="0" strike="noStrike" spc="-1">
+              <a:rPr lang="es-MX" sz="2800" b="0" strike="noStrike" spc="-1" dirty="0">
                 <a:solidFill>
                   <a:schemeClr val="dk1"/>
                 </a:solidFill>
@@ -9059,7 +9059,7 @@
               <a:buChar char=""/>
             </a:pPr>
             <a:r>
-              <a:rPr lang="es-MX" sz="2800" b="0" strike="noStrike" spc="-1">
+              <a:rPr lang="es-MX" sz="2800" b="0" strike="noStrike" spc="-1" dirty="0">
                 <a:solidFill>
                   <a:schemeClr val="dk1"/>
                 </a:solidFill>
@@ -9083,7 +9083,7 @@
               <a:buChar char="•"/>
             </a:pPr>
             <a:r>
-              <a:rPr lang="es-MX" sz="2800" b="0" strike="noStrike" spc="-1">
+              <a:rPr lang="es-MX" sz="2800" b="0" strike="noStrike" spc="-1" dirty="0">
                 <a:solidFill>
                   <a:schemeClr val="dk1"/>
                 </a:solidFill>
@@ -9107,7 +9107,7 @@
               <a:buChar char="•"/>
             </a:pPr>
             <a:r>
-              <a:rPr lang="es-MX" sz="2400" b="0" strike="noStrike" spc="-1">
+              <a:rPr lang="es-MX" sz="2400" b="0" strike="noStrike" spc="-1" dirty="0">
                 <a:solidFill>
                   <a:schemeClr val="dk1"/>
                 </a:solidFill>
@@ -9131,7 +9131,7 @@
               <a:buChar char="•"/>
             </a:pPr>
             <a:r>
-              <a:rPr lang="es-MX" sz="2400" b="0" strike="noStrike" spc="-1">
+              <a:rPr lang="es-MX" sz="2400" b="0" strike="noStrike" spc="-1" dirty="0">
                 <a:solidFill>
                   <a:schemeClr val="dk1"/>
                 </a:solidFill>
@@ -9155,7 +9155,7 @@
               <a:buChar char="•"/>
             </a:pPr>
             <a:r>
-              <a:rPr lang="es-MX" sz="2400" b="0" strike="noStrike" spc="-1">
+              <a:rPr lang="es-MX" sz="2400" b="0" strike="noStrike" spc="-1" dirty="0">
                 <a:solidFill>
                   <a:schemeClr val="dk1"/>
                 </a:solidFill>
@@ -9179,7 +9179,7 @@
               <a:buChar char="•"/>
             </a:pPr>
             <a:r>
-              <a:rPr lang="es-MX" sz="2400" b="0" strike="noStrike" spc="-1">
+              <a:rPr lang="es-MX" sz="2400" b="0" strike="noStrike" spc="-1" dirty="0">
                 <a:solidFill>
                   <a:schemeClr val="dk1"/>
                 </a:solidFill>
@@ -9203,7 +9203,7 @@
               <a:buChar char="•"/>
             </a:pPr>
             <a:r>
-              <a:rPr lang="es-MX" sz="2400" b="0" strike="noStrike" spc="-1">
+              <a:rPr lang="es-MX" sz="2400" b="0" strike="noStrike" spc="-1" dirty="0">
                 <a:solidFill>
                   <a:schemeClr val="dk1"/>
                 </a:solidFill>
@@ -9227,7 +9227,7 @@
               <a:buChar char="•"/>
             </a:pPr>
             <a:r>
-              <a:rPr lang="es-MX" sz="2400" b="0" strike="noStrike" spc="-1">
+              <a:rPr lang="es-MX" sz="2400" b="0" strike="noStrike" spc="-1" dirty="0">
                 <a:solidFill>
                   <a:schemeClr val="dk1"/>
                 </a:solidFill>
@@ -9251,7 +9251,7 @@
               <a:buChar char="•"/>
             </a:pPr>
             <a:r>
-              <a:rPr lang="es-MX" sz="2800" b="0" strike="noStrike" spc="-1">
+              <a:rPr lang="es-MX" sz="2800" b="0" strike="noStrike" spc="-1" dirty="0">
                 <a:solidFill>
                   <a:schemeClr val="dk1"/>
                 </a:solidFill>
@@ -9275,7 +9275,7 @@
               <a:buChar char="•"/>
             </a:pPr>
             <a:r>
-              <a:rPr lang="es-MX" sz="2800" b="0" strike="noStrike" spc="-1">
+              <a:rPr lang="es-MX" sz="2800" b="0" strike="noStrike" spc="-1" dirty="0">
                 <a:solidFill>
                   <a:schemeClr val="dk1"/>
                 </a:solidFill>

</xml_diff>